<commit_message>
convert png to svg
</commit_message>
<xml_diff>
--- a/Specifications/headphones_narrowband_calibration/GUI-Screens.pptx
+++ b/Specifications/headphones_narrowband_calibration/GUI-Screens.pptx
@@ -3351,9 +3351,9 @@
         <p:grpSpPr>
           <a:xfrm>
             <a:off x="3142601" y="108155"/>
-            <a:ext cx="6387828" cy="6617110"/>
+            <a:ext cx="5867785" cy="6617110"/>
             <a:chOff x="3142601" y="108155"/>
-            <a:chExt cx="6387828" cy="6617110"/>
+            <a:chExt cx="5867785" cy="6617110"/>
           </a:xfrm>
         </p:grpSpPr>
         <p:pic>
@@ -3888,7 +3888,7 @@
           <p:spPr>
             <a:xfrm>
               <a:off x="3539699" y="3434487"/>
-              <a:ext cx="5990730" cy="1015663"/>
+              <a:ext cx="5319166" cy="1015663"/>
             </a:xfrm>
             <a:prstGeom prst="rect">
               <a:avLst/>

</xml_diff>

<commit_message>
Update calibration instructions to user
</commit_message>
<xml_diff>
--- a/Specifications/headphones_narrowband_calibration/GUI-Screens.pptx
+++ b/Specifications/headphones_narrowband_calibration/GUI-Screens.pptx
@@ -261,7 +261,7 @@
           <a:p>
             <a:fld id="{6E783203-F72E-42D3-9F56-E7123AD26E23}" type="datetimeFigureOut">
               <a:rPr lang="en-US" smtClean="0"/>
-              <a:t>9/27/2024</a:t>
+              <a:t>1/20/2025</a:t>
             </a:fld>
             <a:endParaRPr lang="en-US"/>
           </a:p>
@@ -459,7 +459,7 @@
           <a:p>
             <a:fld id="{6E783203-F72E-42D3-9F56-E7123AD26E23}" type="datetimeFigureOut">
               <a:rPr lang="en-US" smtClean="0"/>
-              <a:t>9/27/2024</a:t>
+              <a:t>1/20/2025</a:t>
             </a:fld>
             <a:endParaRPr lang="en-US"/>
           </a:p>
@@ -667,7 +667,7 @@
           <a:p>
             <a:fld id="{6E783203-F72E-42D3-9F56-E7123AD26E23}" type="datetimeFigureOut">
               <a:rPr lang="en-US" smtClean="0"/>
-              <a:t>9/27/2024</a:t>
+              <a:t>1/20/2025</a:t>
             </a:fld>
             <a:endParaRPr lang="en-US"/>
           </a:p>
@@ -865,7 +865,7 @@
           <a:p>
             <a:fld id="{6E783203-F72E-42D3-9F56-E7123AD26E23}" type="datetimeFigureOut">
               <a:rPr lang="en-US" smtClean="0"/>
-              <a:t>9/27/2024</a:t>
+              <a:t>1/20/2025</a:t>
             </a:fld>
             <a:endParaRPr lang="en-US"/>
           </a:p>
@@ -1140,7 +1140,7 @@
           <a:p>
             <a:fld id="{6E783203-F72E-42D3-9F56-E7123AD26E23}" type="datetimeFigureOut">
               <a:rPr lang="en-US" smtClean="0"/>
-              <a:t>9/27/2024</a:t>
+              <a:t>1/20/2025</a:t>
             </a:fld>
             <a:endParaRPr lang="en-US"/>
           </a:p>
@@ -1405,7 +1405,7 @@
           <a:p>
             <a:fld id="{6E783203-F72E-42D3-9F56-E7123AD26E23}" type="datetimeFigureOut">
               <a:rPr lang="en-US" smtClean="0"/>
-              <a:t>9/27/2024</a:t>
+              <a:t>1/20/2025</a:t>
             </a:fld>
             <a:endParaRPr lang="en-US"/>
           </a:p>
@@ -1817,7 +1817,7 @@
           <a:p>
             <a:fld id="{6E783203-F72E-42D3-9F56-E7123AD26E23}" type="datetimeFigureOut">
               <a:rPr lang="en-US" smtClean="0"/>
-              <a:t>9/27/2024</a:t>
+              <a:t>1/20/2025</a:t>
             </a:fld>
             <a:endParaRPr lang="en-US"/>
           </a:p>
@@ -1958,7 +1958,7 @@
           <a:p>
             <a:fld id="{6E783203-F72E-42D3-9F56-E7123AD26E23}" type="datetimeFigureOut">
               <a:rPr lang="en-US" smtClean="0"/>
-              <a:t>9/27/2024</a:t>
+              <a:t>1/20/2025</a:t>
             </a:fld>
             <a:endParaRPr lang="en-US"/>
           </a:p>
@@ -2071,7 +2071,7 @@
           <a:p>
             <a:fld id="{6E783203-F72E-42D3-9F56-E7123AD26E23}" type="datetimeFigureOut">
               <a:rPr lang="en-US" smtClean="0"/>
-              <a:t>9/27/2024</a:t>
+              <a:t>1/20/2025</a:t>
             </a:fld>
             <a:endParaRPr lang="en-US"/>
           </a:p>
@@ -2382,7 +2382,7 @@
           <a:p>
             <a:fld id="{6E783203-F72E-42D3-9F56-E7123AD26E23}" type="datetimeFigureOut">
               <a:rPr lang="en-US" smtClean="0"/>
-              <a:t>9/27/2024</a:t>
+              <a:t>1/20/2025</a:t>
             </a:fld>
             <a:endParaRPr lang="en-US"/>
           </a:p>
@@ -2670,7 +2670,7 @@
           <a:p>
             <a:fld id="{6E783203-F72E-42D3-9F56-E7123AD26E23}" type="datetimeFigureOut">
               <a:rPr lang="en-US" smtClean="0"/>
-              <a:t>9/27/2024</a:t>
+              <a:t>1/20/2025</a:t>
             </a:fld>
             <a:endParaRPr lang="en-US"/>
           </a:p>
@@ -2911,7 +2911,7 @@
           <a:p>
             <a:fld id="{6E783203-F72E-42D3-9F56-E7123AD26E23}" type="datetimeFigureOut">
               <a:rPr lang="en-US" smtClean="0"/>
-              <a:t>9/27/2024</a:t>
+              <a:t>1/20/2025</a:t>
             </a:fld>
             <a:endParaRPr lang="en-US"/>
           </a:p>
@@ -3538,7 +3538,7 @@
             <p:spPr>
               <a:xfrm>
                 <a:off x="3539699" y="953151"/>
-                <a:ext cx="5161936" cy="2308324"/>
+                <a:ext cx="5161936" cy="3108543"/>
               </a:xfrm>
               <a:prstGeom prst="rect">
                 <a:avLst/>
@@ -3557,7 +3557,7 @@
                   </a:spcAft>
                 </a:pPr>
                 <a:r>
-                  <a:rPr lang="en-US" sz="2400" kern="1200" dirty="0" err="1">
+                  <a:rPr lang="en-US" sz="2000" kern="1200" dirty="0" err="1">
                     <a:solidFill>
                       <a:schemeClr val="tx1"/>
                     </a:solidFill>
@@ -3568,7 +3568,7 @@
                   <a:t>InstructionText</a:t>
                 </a:r>
                 <a:r>
-                  <a:rPr lang="en-US" sz="2400" kern="1200" dirty="0">
+                  <a:rPr lang="en-US" sz="2000" kern="1200" dirty="0">
                     <a:solidFill>
                       <a:schemeClr val="tx1"/>
                     </a:solidFill>
@@ -3576,10 +3576,50 @@
                     <a:ea typeface="+mn-ea"/>
                     <a:cs typeface="+mn-cs"/>
                   </a:rPr>
-                  <a:t>: “Press Play/Stop to start/stop the tone. Use the +/- buttons to adjust the output level until the flat plate reads [</a:t>
+                  <a:t>: </a:t>
+                </a:r>
+              </a:p>
+              <a:p>
+                <a:pPr marL="342900" indent="-342900" defTabSz="1453896">
+                  <a:spcAft>
+                    <a:spcPts val="600"/>
+                  </a:spcAft>
+                  <a:buFont typeface="Arial" panose="020B0604020202020204" pitchFamily="34" charset="0"/>
+                  <a:buChar char="•"/>
+                </a:pPr>
+                <a:r>
+                  <a:rPr lang="en-US" sz="1600" kern="1200" dirty="0">
+                    <a:solidFill>
+                      <a:schemeClr val="tx1"/>
+                    </a:solidFill>
+                    <a:latin typeface="+mn-lt"/>
+                    <a:ea typeface="+mn-ea"/>
+                    <a:cs typeface="+mn-cs"/>
+                  </a:rPr>
+                  <a:t>Press Play/Stop to start/stop the tone</a:t>
+                </a:r>
+              </a:p>
+              <a:p>
+                <a:pPr marL="342900" indent="-342900" defTabSz="1453896">
+                  <a:spcAft>
+                    <a:spcPts val="600"/>
+                  </a:spcAft>
+                  <a:buFont typeface="Arial" panose="020B0604020202020204" pitchFamily="34" charset="0"/>
+                  <a:buChar char="•"/>
+                </a:pPr>
+                <a:r>
+                  <a:rPr lang="en-US" sz="1600" kern="1200" dirty="0">
+                    <a:solidFill>
+                      <a:schemeClr val="tx1"/>
+                    </a:solidFill>
+                    <a:latin typeface="+mn-lt"/>
+                    <a:ea typeface="+mn-ea"/>
+                    <a:cs typeface="+mn-cs"/>
+                  </a:rPr>
+                  <a:t>Use the +/- buttons to adjust the output level until the flat plate reads [</a:t>
                 </a:r>
                 <a:r>
-                  <a:rPr lang="en-US" sz="2400" kern="1200" dirty="0" err="1">
+                  <a:rPr lang="en-US" sz="1600" kern="1200" dirty="0" err="1">
                     <a:solidFill>
                       <a:schemeClr val="tx1"/>
                     </a:solidFill>
@@ -3590,7 +3630,7 @@
                   <a:t>TargetLevel</a:t>
                 </a:r>
                 <a:r>
-                  <a:rPr lang="en-US" sz="2400" kern="1200" dirty="0">
+                  <a:rPr lang="en-US" sz="1600" kern="1200" dirty="0">
                     <a:solidFill>
                       <a:schemeClr val="tx1"/>
                     </a:solidFill>
@@ -3598,9 +3638,98 @@
                     <a:ea typeface="+mn-ea"/>
                     <a:cs typeface="+mn-cs"/>
                   </a:rPr>
-                  <a:t>] dB SPL (+/- 3 dB). Press Next when done.” </a:t>
+                  <a:t>] dB SPL (+/- 3 dB)</a:t>
                 </a:r>
-                <a:endParaRPr lang="en-US" sz="1400" dirty="0"/>
+                <a:endParaRPr lang="en-US" sz="1600" dirty="0"/>
+              </a:p>
+              <a:p>
+                <a:pPr marL="342900" indent="-342900" defTabSz="1453896">
+                  <a:spcAft>
+                    <a:spcPts val="600"/>
+                  </a:spcAft>
+                  <a:buFont typeface="Arial" panose="020B0604020202020204" pitchFamily="34" charset="0"/>
+                  <a:buChar char="•"/>
+                </a:pPr>
+                <a:r>
+                  <a:rPr lang="en-US" sz="1600" kern="1200" dirty="0">
+                    <a:solidFill>
+                      <a:schemeClr val="tx1"/>
+                    </a:solidFill>
+                    <a:latin typeface="+mn-lt"/>
+                    <a:ea typeface="+mn-ea"/>
+                    <a:cs typeface="+mn-cs"/>
+                  </a:rPr>
+                  <a:t> Press Next when done</a:t>
+                </a:r>
+                <a:endParaRPr lang="en-US" sz="1600" dirty="0"/>
+              </a:p>
+              <a:p>
+                <a:pPr marL="342900" indent="-342900" defTabSz="1453896">
+                  <a:spcAft>
+                    <a:spcPts val="600"/>
+                  </a:spcAft>
+                  <a:buFont typeface="Arial" panose="020B0604020202020204" pitchFamily="34" charset="0"/>
+                  <a:buChar char="•"/>
+                </a:pPr>
+                <a:r>
+                  <a:rPr lang="en-US" sz="1600" kern="1200" dirty="0">
+                    <a:solidFill>
+                      <a:schemeClr val="tx1"/>
+                    </a:solidFill>
+                    <a:latin typeface="+mn-lt"/>
+                    <a:ea typeface="+mn-ea"/>
+                    <a:cs typeface="+mn-cs"/>
+                  </a:rPr>
+                  <a:t>Use Linear Weighting in your signal path during calibration</a:t>
+                </a:r>
+              </a:p>
+              <a:p>
+                <a:pPr marL="342900" indent="-342900" defTabSz="1453896">
+                  <a:spcAft>
+                    <a:spcPts val="600"/>
+                  </a:spcAft>
+                  <a:buFont typeface="Arial" panose="020B0604020202020204" pitchFamily="34" charset="0"/>
+                  <a:buChar char="•"/>
+                </a:pPr>
+                <a:r>
+                  <a:rPr lang="en-US" sz="1600" dirty="0"/>
+                  <a:t>Ensure no clipping in your signal path</a:t>
+                </a:r>
+                <a:endParaRPr lang="en-US" sz="1600" kern="1200" dirty="0">
+                  <a:solidFill>
+                    <a:schemeClr val="tx1"/>
+                  </a:solidFill>
+                  <a:latin typeface="+mn-lt"/>
+                  <a:ea typeface="+mn-ea"/>
+                  <a:cs typeface="+mn-cs"/>
+                </a:endParaRPr>
+              </a:p>
+              <a:p>
+                <a:pPr marL="342900" indent="-342900" defTabSz="1453896">
+                  <a:spcAft>
+                    <a:spcPts val="600"/>
+                  </a:spcAft>
+                  <a:buFont typeface="Arial" panose="020B0604020202020204" pitchFamily="34" charset="0"/>
+                  <a:buChar char="•"/>
+                </a:pPr>
+                <a:endParaRPr lang="en-US" kern="1200" dirty="0">
+                  <a:solidFill>
+                    <a:schemeClr val="tx1"/>
+                  </a:solidFill>
+                  <a:latin typeface="+mn-lt"/>
+                  <a:ea typeface="+mn-ea"/>
+                  <a:cs typeface="+mn-cs"/>
+                </a:endParaRPr>
+              </a:p>
+              <a:p>
+                <a:pPr marL="342900" indent="-342900" defTabSz="1453896">
+                  <a:spcAft>
+                    <a:spcPts val="600"/>
+                  </a:spcAft>
+                  <a:buFont typeface="Arial" panose="020B0604020202020204" pitchFamily="34" charset="0"/>
+                  <a:buChar char="•"/>
+                </a:pPr>
+                <a:endParaRPr lang="en-US" sz="1100" dirty="0"/>
               </a:p>
             </p:txBody>
           </p:sp>
@@ -3907,8 +4036,8 @@
             </p:nvSpPr>
             <p:spPr>
               <a:xfrm>
-                <a:off x="3539699" y="3434487"/>
-                <a:ext cx="5319166" cy="1015663"/>
+                <a:off x="3539699" y="3568920"/>
+                <a:ext cx="5319166" cy="923330"/>
               </a:xfrm>
               <a:prstGeom prst="rect">
                 <a:avLst/>
@@ -3922,19 +4051,19 @@
               <a:lstStyle/>
               <a:p>
                 <a:r>
-                  <a:rPr lang="en-US" sz="2000" b="1" i="1" dirty="0"/>
+                  <a:rPr lang="en-US" b="1" i="1" dirty="0"/>
                   <a:t>Target Level: [Current Target Level] dB SPL</a:t>
                 </a:r>
               </a:p>
               <a:p>
                 <a:r>
-                  <a:rPr lang="en-US" sz="2000" b="1" i="1" dirty="0"/>
+                  <a:rPr lang="en-US" b="1" i="1" dirty="0"/>
                   <a:t>Frequency: [Current Frequency] Hz</a:t>
                 </a:r>
               </a:p>
               <a:p>
                 <a:r>
-                  <a:rPr lang="en-US" sz="2000" b="1" i="1" dirty="0"/>
+                  <a:rPr lang="en-US" b="1" i="1" dirty="0"/>
                   <a:t>Ear Cup: [Current Ear Cup]</a:t>
                 </a:r>
               </a:p>

</xml_diff>